<commit_message>
Minor modification to presentation
minor modification to presentation
</commit_message>
<xml_diff>
--- a/presentation/SOEN_690_Team_12.pptx
+++ b/presentation/SOEN_690_Team_12.pptx
@@ -10940,6 +10940,29 @@
               </a:rPr>
               <a:t>https://scikit-learn.org/stable/modules/generated/sklearn.metrics.precision_recall_fscore_support.html</a:t>
             </a:r>
+            <a:endParaRPr lang="en-CA" u="sng" dirty="0"/>
+          </a:p>
+          <a:p>
+            <a:pPr>
+              <a:buFont typeface="Wingdings" panose="05000000000000000000" pitchFamily="2" charset="2"/>
+              <a:buChar char="q"/>
+            </a:pPr>
+            <a:r>
+              <a:rPr lang="en-CA">
+                <a:hlinkClick r:id="rId6"/>
+              </a:rPr>
+              <a:t>https://scikit-learn.org/stable/modules/generated/sklearn.model_selection.KFold.html</a:t>
+            </a:r>
+            <a:r>
+              <a:rPr lang="en-CA"/>
+              <a:t> </a:t>
+            </a:r>
+          </a:p>
+          <a:p>
+            <a:pPr>
+              <a:buFont typeface="Wingdings" panose="05000000000000000000" pitchFamily="2" charset="2"/>
+              <a:buChar char="q"/>
+            </a:pPr>
             <a:endParaRPr lang="en-CA" dirty="0"/>
           </a:p>
           <a:p>
@@ -15071,6 +15094,36 @@
           </a:p>
         </p:txBody>
       </p:sp>
+      <p:pic>
+        <p:nvPicPr>
+          <p:cNvPr id="3" name="Picture 2">
+            <a:extLst>
+              <a:ext uri="{FF2B5EF4-FFF2-40B4-BE49-F238E27FC236}">
+                <a16:creationId xmlns:a16="http://schemas.microsoft.com/office/drawing/2014/main" id="{AB539F66-2819-43DD-8730-D8582B4EAE9C}"/>
+              </a:ext>
+            </a:extLst>
+          </p:cNvPr>
+          <p:cNvPicPr>
+            <a:picLocks noChangeAspect="1"/>
+          </p:cNvPicPr>
+          <p:nvPr/>
+        </p:nvPicPr>
+        <p:blipFill>
+          <a:blip r:embed="rId3"/>
+          <a:stretch>
+            <a:fillRect/>
+          </a:stretch>
+        </p:blipFill>
+        <p:spPr>
+          <a:xfrm>
+            <a:off x="2221977" y="83845"/>
+            <a:ext cx="3400900" cy="628738"/>
+          </a:xfrm>
+          <a:prstGeom prst="rect">
+            <a:avLst/>
+          </a:prstGeom>
+        </p:spPr>
+      </p:pic>
     </p:spTree>
     <p:extLst>
       <p:ext uri="{BB962C8B-B14F-4D97-AF65-F5344CB8AC3E}">

</xml_diff>